<commit_message>
Write specification for SS304 module.
</commit_message>
<xml_diff>
--- a/fig/CSInnerSystem.pptx
+++ b/fig/CSInnerSystem.pptx
@@ -112,23 +112,31 @@
 </p:presentation>
 </file>
 
+<file path=ppt/revisionInfo.xml><?xml version="1.0" encoding="utf-8"?>
+<p1510:revInfo xmlns:a="http://schemas.openxmlformats.org/drawingml/2006/main" xmlns:r="http://schemas.openxmlformats.org/officeDocument/2006/relationships" xmlns:p1510="http://schemas.microsoft.com/office/powerpoint/2015/10/main">
+  <p1510:revLst>
+    <p1510:client id="{EDCDFE2F-F025-43DC-930D-CF6B3F2AE6E3}" v="4" dt="2025-12-08T05:33:18.369"/>
+  </p1510:revLst>
+</p1510:revInfo>
+</file>
+
 <file path=ppt/changesInfos/changesInfo1.xml><?xml version="1.0" encoding="utf-8"?>
 <pc:chgInfo xmlns:a="http://schemas.openxmlformats.org/drawingml/2006/main" xmlns:r="http://schemas.openxmlformats.org/officeDocument/2006/relationships" xmlns:ac="http://schemas.microsoft.com/office/drawing/2013/main/command" xmlns:pc="http://schemas.microsoft.com/office/powerpoint/2013/main/command">
   <pc:docChgLst>
-    <pc:chgData name="UCHIYAMA Yuusuke" userId="758e3d5f-3bbb-4028-bd3a-66c5ef996226" providerId="ADAL" clId="{E78784A1-80B4-458F-8EC5-7324D40B57FB}"/>
-    <pc:docChg chg="undo custSel modSld">
-      <pc:chgData name="UCHIYAMA Yuusuke" userId="758e3d5f-3bbb-4028-bd3a-66c5ef996226" providerId="ADAL" clId="{E78784A1-80B4-458F-8EC5-7324D40B57FB}" dt="2024-12-25T02:07:46.241" v="48" actId="1035"/>
+    <pc:chgData name="UCHIYAMA Yuusuke" userId="758e3d5f-3bbb-4028-bd3a-66c5ef996226" providerId="ADAL" clId="{8DA8F7F8-1A63-4483-BCFA-22CC77006ABC}"/>
+    <pc:docChg chg="modSld">
+      <pc:chgData name="UCHIYAMA Yuusuke" userId="758e3d5f-3bbb-4028-bd3a-66c5ef996226" providerId="ADAL" clId="{8DA8F7F8-1A63-4483-BCFA-22CC77006ABC}" dt="2025-12-08T05:33:18.369" v="3" actId="20577"/>
       <pc:docMkLst>
         <pc:docMk/>
       </pc:docMkLst>
-      <pc:sldChg chg="addSp delSp modSp mod">
-        <pc:chgData name="UCHIYAMA Yuusuke" userId="758e3d5f-3bbb-4028-bd3a-66c5ef996226" providerId="ADAL" clId="{E78784A1-80B4-458F-8EC5-7324D40B57FB}" dt="2024-12-25T02:07:46.241" v="48" actId="1035"/>
+      <pc:sldChg chg="modSp">
+        <pc:chgData name="UCHIYAMA Yuusuke" userId="758e3d5f-3bbb-4028-bd3a-66c5ef996226" providerId="ADAL" clId="{8DA8F7F8-1A63-4483-BCFA-22CC77006ABC}" dt="2025-12-08T05:33:18.369" v="3" actId="20577"/>
         <pc:sldMkLst>
           <pc:docMk/>
           <pc:sldMk cId="1699194054" sldId="256"/>
         </pc:sldMkLst>
         <pc:spChg chg="mod">
-          <ac:chgData name="UCHIYAMA Yuusuke" userId="758e3d5f-3bbb-4028-bd3a-66c5ef996226" providerId="ADAL" clId="{E78784A1-80B4-458F-8EC5-7324D40B57FB}" dt="2024-12-25T02:03:49.158" v="1"/>
+          <ac:chgData name="UCHIYAMA Yuusuke" userId="758e3d5f-3bbb-4028-bd3a-66c5ef996226" providerId="ADAL" clId="{8DA8F7F8-1A63-4483-BCFA-22CC77006ABC}" dt="2025-12-08T05:33:18.369" v="3" actId="20577"/>
           <ac:spMkLst>
             <pc:docMk/>
             <pc:sldMk cId="1699194054" sldId="256"/>
@@ -136,7 +144,7 @@
           </ac:spMkLst>
         </pc:spChg>
         <pc:spChg chg="mod">
-          <ac:chgData name="UCHIYAMA Yuusuke" userId="758e3d5f-3bbb-4028-bd3a-66c5ef996226" providerId="ADAL" clId="{E78784A1-80B4-458F-8EC5-7324D40B57FB}" dt="2024-12-25T02:03:49.158" v="1"/>
+          <ac:chgData name="UCHIYAMA Yuusuke" userId="758e3d5f-3bbb-4028-bd3a-66c5ef996226" providerId="ADAL" clId="{8DA8F7F8-1A63-4483-BCFA-22CC77006ABC}" dt="2025-12-08T05:33:18.369" v="3" actId="20577"/>
           <ac:spMkLst>
             <pc:docMk/>
             <pc:sldMk cId="1699194054" sldId="256"/>
@@ -144,7 +152,7 @@
           </ac:spMkLst>
         </pc:spChg>
         <pc:spChg chg="mod">
-          <ac:chgData name="UCHIYAMA Yuusuke" userId="758e3d5f-3bbb-4028-bd3a-66c5ef996226" providerId="ADAL" clId="{E78784A1-80B4-458F-8EC5-7324D40B57FB}" dt="2024-12-25T02:05:57.693" v="11" actId="1076"/>
+          <ac:chgData name="UCHIYAMA Yuusuke" userId="758e3d5f-3bbb-4028-bd3a-66c5ef996226" providerId="ADAL" clId="{8DA8F7F8-1A63-4483-BCFA-22CC77006ABC}" dt="2025-12-08T05:33:18.369" v="3" actId="20577"/>
           <ac:spMkLst>
             <pc:docMk/>
             <pc:sldMk cId="1699194054" sldId="256"/>
@@ -152,7 +160,7 @@
           </ac:spMkLst>
         </pc:spChg>
         <pc:spChg chg="mod">
-          <ac:chgData name="UCHIYAMA Yuusuke" userId="758e3d5f-3bbb-4028-bd3a-66c5ef996226" providerId="ADAL" clId="{E78784A1-80B4-458F-8EC5-7324D40B57FB}" dt="2024-12-25T02:03:49.158" v="1"/>
+          <ac:chgData name="UCHIYAMA Yuusuke" userId="758e3d5f-3bbb-4028-bd3a-66c5ef996226" providerId="ADAL" clId="{8DA8F7F8-1A63-4483-BCFA-22CC77006ABC}" dt="2025-12-08T05:33:18.369" v="3" actId="20577"/>
           <ac:spMkLst>
             <pc:docMk/>
             <pc:sldMk cId="1699194054" sldId="256"/>
@@ -160,7 +168,7 @@
           </ac:spMkLst>
         </pc:spChg>
         <pc:spChg chg="mod">
-          <ac:chgData name="UCHIYAMA Yuusuke" userId="758e3d5f-3bbb-4028-bd3a-66c5ef996226" providerId="ADAL" clId="{E78784A1-80B4-458F-8EC5-7324D40B57FB}" dt="2024-12-25T02:06:18.536" v="16" actId="1076"/>
+          <ac:chgData name="UCHIYAMA Yuusuke" userId="758e3d5f-3bbb-4028-bd3a-66c5ef996226" providerId="ADAL" clId="{8DA8F7F8-1A63-4483-BCFA-22CC77006ABC}" dt="2025-12-08T05:33:18.369" v="3" actId="20577"/>
           <ac:spMkLst>
             <pc:docMk/>
             <pc:sldMk cId="1699194054" sldId="256"/>
@@ -168,7 +176,7 @@
           </ac:spMkLst>
         </pc:spChg>
         <pc:spChg chg="mod">
-          <ac:chgData name="UCHIYAMA Yuusuke" userId="758e3d5f-3bbb-4028-bd3a-66c5ef996226" providerId="ADAL" clId="{E78784A1-80B4-458F-8EC5-7324D40B57FB}" dt="2024-12-25T02:03:49.158" v="1"/>
+          <ac:chgData name="UCHIYAMA Yuusuke" userId="758e3d5f-3bbb-4028-bd3a-66c5ef996226" providerId="ADAL" clId="{8DA8F7F8-1A63-4483-BCFA-22CC77006ABC}" dt="2025-12-08T05:33:18.369" v="3" actId="20577"/>
           <ac:spMkLst>
             <pc:docMk/>
             <pc:sldMk cId="1699194054" sldId="256"/>
@@ -176,7 +184,7 @@
           </ac:spMkLst>
         </pc:spChg>
         <pc:spChg chg="mod">
-          <ac:chgData name="UCHIYAMA Yuusuke" userId="758e3d5f-3bbb-4028-bd3a-66c5ef996226" providerId="ADAL" clId="{E78784A1-80B4-458F-8EC5-7324D40B57FB}" dt="2024-12-25T02:03:49.158" v="1"/>
+          <ac:chgData name="UCHIYAMA Yuusuke" userId="758e3d5f-3bbb-4028-bd3a-66c5ef996226" providerId="ADAL" clId="{8DA8F7F8-1A63-4483-BCFA-22CC77006ABC}" dt="2025-12-08T05:33:18.369" v="3" actId="20577"/>
           <ac:spMkLst>
             <pc:docMk/>
             <pc:sldMk cId="1699194054" sldId="256"/>
@@ -184,7 +192,7 @@
           </ac:spMkLst>
         </pc:spChg>
         <pc:spChg chg="mod">
-          <ac:chgData name="UCHIYAMA Yuusuke" userId="758e3d5f-3bbb-4028-bd3a-66c5ef996226" providerId="ADAL" clId="{E78784A1-80B4-458F-8EC5-7324D40B57FB}" dt="2024-12-25T02:03:49.158" v="1"/>
+          <ac:chgData name="UCHIYAMA Yuusuke" userId="758e3d5f-3bbb-4028-bd3a-66c5ef996226" providerId="ADAL" clId="{8DA8F7F8-1A63-4483-BCFA-22CC77006ABC}" dt="2025-12-08T05:33:18.369" v="3" actId="20577"/>
           <ac:spMkLst>
             <pc:docMk/>
             <pc:sldMk cId="1699194054" sldId="256"/>
@@ -192,7 +200,7 @@
           </ac:spMkLst>
         </pc:spChg>
         <pc:spChg chg="mod">
-          <ac:chgData name="UCHIYAMA Yuusuke" userId="758e3d5f-3bbb-4028-bd3a-66c5ef996226" providerId="ADAL" clId="{E78784A1-80B4-458F-8EC5-7324D40B57FB}" dt="2024-12-25T02:03:49.158" v="1"/>
+          <ac:chgData name="UCHIYAMA Yuusuke" userId="758e3d5f-3bbb-4028-bd3a-66c5ef996226" providerId="ADAL" clId="{8DA8F7F8-1A63-4483-BCFA-22CC77006ABC}" dt="2025-12-08T05:33:18.369" v="3" actId="20577"/>
           <ac:spMkLst>
             <pc:docMk/>
             <pc:sldMk cId="1699194054" sldId="256"/>
@@ -200,237 +208,13 @@
           </ac:spMkLst>
         </pc:spChg>
         <pc:spChg chg="mod">
-          <ac:chgData name="UCHIYAMA Yuusuke" userId="758e3d5f-3bbb-4028-bd3a-66c5ef996226" providerId="ADAL" clId="{E78784A1-80B4-458F-8EC5-7324D40B57FB}" dt="2024-12-25T02:03:49.158" v="1"/>
+          <ac:chgData name="UCHIYAMA Yuusuke" userId="758e3d5f-3bbb-4028-bd3a-66c5ef996226" providerId="ADAL" clId="{8DA8F7F8-1A63-4483-BCFA-22CC77006ABC}" dt="2025-12-08T05:33:18.369" v="3" actId="20577"/>
           <ac:spMkLst>
             <pc:docMk/>
             <pc:sldMk cId="1699194054" sldId="256"/>
             <ac:spMk id="49" creationId="{5D034A88-CD4E-7E88-462A-F0A9C6C7E7BC}"/>
           </ac:spMkLst>
         </pc:spChg>
-        <pc:spChg chg="add mod">
-          <ac:chgData name="UCHIYAMA Yuusuke" userId="758e3d5f-3bbb-4028-bd3a-66c5ef996226" providerId="ADAL" clId="{E78784A1-80B4-458F-8EC5-7324D40B57FB}" dt="2024-12-25T02:07:46.241" v="48" actId="1035"/>
-          <ac:spMkLst>
-            <pc:docMk/>
-            <pc:sldMk cId="1699194054" sldId="256"/>
-            <ac:spMk id="51" creationId="{F04460BD-5234-4367-C16D-A099FA01C2D2}"/>
-          </ac:spMkLst>
-        </pc:spChg>
-        <pc:spChg chg="add mod">
-          <ac:chgData name="UCHIYAMA Yuusuke" userId="758e3d5f-3bbb-4028-bd3a-66c5ef996226" providerId="ADAL" clId="{E78784A1-80B4-458F-8EC5-7324D40B57FB}" dt="2024-12-25T02:07:46.241" v="48" actId="1035"/>
-          <ac:spMkLst>
-            <pc:docMk/>
-            <pc:sldMk cId="1699194054" sldId="256"/>
-            <ac:spMk id="54" creationId="{60B87739-26D3-B29A-8E7D-EA03BA44402F}"/>
-          </ac:spMkLst>
-        </pc:spChg>
-        <pc:spChg chg="add mod">
-          <ac:chgData name="UCHIYAMA Yuusuke" userId="758e3d5f-3bbb-4028-bd3a-66c5ef996226" providerId="ADAL" clId="{E78784A1-80B4-458F-8EC5-7324D40B57FB}" dt="2024-12-25T02:07:46.241" v="48" actId="1035"/>
-          <ac:spMkLst>
-            <pc:docMk/>
-            <pc:sldMk cId="1699194054" sldId="256"/>
-            <ac:spMk id="56" creationId="{4D5170A6-0EC6-C0CD-883E-779F09EE6C97}"/>
-          </ac:spMkLst>
-        </pc:spChg>
-        <pc:grpChg chg="add mod">
-          <ac:chgData name="UCHIYAMA Yuusuke" userId="758e3d5f-3bbb-4028-bd3a-66c5ef996226" providerId="ADAL" clId="{E78784A1-80B4-458F-8EC5-7324D40B57FB}" dt="2024-12-25T02:07:46.241" v="48" actId="1035"/>
-          <ac:grpSpMkLst>
-            <pc:docMk/>
-            <pc:sldMk cId="1699194054" sldId="256"/>
-            <ac:grpSpMk id="2" creationId="{55A18239-71CC-29A6-E1DD-EE839C2CC46B}"/>
-          </ac:grpSpMkLst>
-        </pc:grpChg>
-        <pc:grpChg chg="del">
-          <ac:chgData name="UCHIYAMA Yuusuke" userId="758e3d5f-3bbb-4028-bd3a-66c5ef996226" providerId="ADAL" clId="{E78784A1-80B4-458F-8EC5-7324D40B57FB}" dt="2024-12-25T02:03:37.345" v="0" actId="21"/>
-          <ac:grpSpMkLst>
-            <pc:docMk/>
-            <pc:sldMk cId="1699194054" sldId="256"/>
-            <ac:grpSpMk id="33" creationId="{B8A7220A-76CA-53D9-C300-21907B12C0BC}"/>
-          </ac:grpSpMkLst>
-        </pc:grpChg>
-        <pc:picChg chg="mod modCrop">
-          <ac:chgData name="UCHIYAMA Yuusuke" userId="758e3d5f-3bbb-4028-bd3a-66c5ef996226" providerId="ADAL" clId="{E78784A1-80B4-458F-8EC5-7324D40B57FB}" dt="2024-12-25T02:04:52.318" v="6" actId="732"/>
-          <ac:picMkLst>
-            <pc:docMk/>
-            <pc:sldMk cId="1699194054" sldId="256"/>
-            <ac:picMk id="6" creationId="{7DAC6989-86CA-2B1D-2929-3A29B0FBB001}"/>
-          </ac:picMkLst>
-        </pc:picChg>
-        <pc:cxnChg chg="mod">
-          <ac:chgData name="UCHIYAMA Yuusuke" userId="758e3d5f-3bbb-4028-bd3a-66c5ef996226" providerId="ADAL" clId="{E78784A1-80B4-458F-8EC5-7324D40B57FB}" dt="2024-12-25T02:03:37.345" v="0" actId="21"/>
-          <ac:cxnSpMkLst>
-            <pc:docMk/>
-            <pc:sldMk cId="1699194054" sldId="256"/>
-            <ac:cxnSpMk id="26" creationId="{FD92AFA0-40AE-D4BF-C268-9D15A6C72E3F}"/>
-          </ac:cxnSpMkLst>
-        </pc:cxnChg>
-        <pc:cxnChg chg="mod">
-          <ac:chgData name="UCHIYAMA Yuusuke" userId="758e3d5f-3bbb-4028-bd3a-66c5ef996226" providerId="ADAL" clId="{E78784A1-80B4-458F-8EC5-7324D40B57FB}" dt="2024-12-25T02:03:49.158" v="1"/>
-          <ac:cxnSpMkLst>
-            <pc:docMk/>
-            <pc:sldMk cId="1699194054" sldId="256"/>
-            <ac:cxnSpMk id="37" creationId="{7EA691E0-6533-1F29-365A-BA17717B22DC}"/>
-          </ac:cxnSpMkLst>
-        </pc:cxnChg>
-        <pc:cxnChg chg="mod">
-          <ac:chgData name="UCHIYAMA Yuusuke" userId="758e3d5f-3bbb-4028-bd3a-66c5ef996226" providerId="ADAL" clId="{E78784A1-80B4-458F-8EC5-7324D40B57FB}" dt="2024-12-25T02:03:49.158" v="1"/>
-          <ac:cxnSpMkLst>
-            <pc:docMk/>
-            <pc:sldMk cId="1699194054" sldId="256"/>
-            <ac:cxnSpMk id="38" creationId="{007E7A0B-B60F-073E-D25B-61C0ACDF6F79}"/>
-          </ac:cxnSpMkLst>
-        </pc:cxnChg>
-        <pc:cxnChg chg="mod">
-          <ac:chgData name="UCHIYAMA Yuusuke" userId="758e3d5f-3bbb-4028-bd3a-66c5ef996226" providerId="ADAL" clId="{E78784A1-80B4-458F-8EC5-7324D40B57FB}" dt="2024-12-25T02:03:49.158" v="1"/>
-          <ac:cxnSpMkLst>
-            <pc:docMk/>
-            <pc:sldMk cId="1699194054" sldId="256"/>
-            <ac:cxnSpMk id="39" creationId="{09EA21AB-D490-0AC2-A8ED-3922B94A07CA}"/>
-          </ac:cxnSpMkLst>
-        </pc:cxnChg>
-        <pc:cxnChg chg="mod">
-          <ac:chgData name="UCHIYAMA Yuusuke" userId="758e3d5f-3bbb-4028-bd3a-66c5ef996226" providerId="ADAL" clId="{E78784A1-80B4-458F-8EC5-7324D40B57FB}" dt="2024-12-25T02:03:49.158" v="1"/>
-          <ac:cxnSpMkLst>
-            <pc:docMk/>
-            <pc:sldMk cId="1699194054" sldId="256"/>
-            <ac:cxnSpMk id="40" creationId="{DCB63E80-290B-22A2-6B8B-735D82819EE7}"/>
-          </ac:cxnSpMkLst>
-        </pc:cxnChg>
-        <pc:cxnChg chg="mod">
-          <ac:chgData name="UCHIYAMA Yuusuke" userId="758e3d5f-3bbb-4028-bd3a-66c5ef996226" providerId="ADAL" clId="{E78784A1-80B4-458F-8EC5-7324D40B57FB}" dt="2024-12-25T02:03:49.158" v="1"/>
-          <ac:cxnSpMkLst>
-            <pc:docMk/>
-            <pc:sldMk cId="1699194054" sldId="256"/>
-            <ac:cxnSpMk id="42" creationId="{92A11B1F-FD3B-3C2E-F9F9-6631CF012F99}"/>
-          </ac:cxnSpMkLst>
-        </pc:cxnChg>
-        <pc:cxnChg chg="mod">
-          <ac:chgData name="UCHIYAMA Yuusuke" userId="758e3d5f-3bbb-4028-bd3a-66c5ef996226" providerId="ADAL" clId="{E78784A1-80B4-458F-8EC5-7324D40B57FB}" dt="2024-12-25T02:03:49.158" v="1"/>
-          <ac:cxnSpMkLst>
-            <pc:docMk/>
-            <pc:sldMk cId="1699194054" sldId="256"/>
-            <ac:cxnSpMk id="43" creationId="{5D98CF68-C8A6-839F-76B6-3B9D0D37E719}"/>
-          </ac:cxnSpMkLst>
-        </pc:cxnChg>
-        <pc:cxnChg chg="mod">
-          <ac:chgData name="UCHIYAMA Yuusuke" userId="758e3d5f-3bbb-4028-bd3a-66c5ef996226" providerId="ADAL" clId="{E78784A1-80B4-458F-8EC5-7324D40B57FB}" dt="2024-12-25T02:03:49.158" v="1"/>
-          <ac:cxnSpMkLst>
-            <pc:docMk/>
-            <pc:sldMk cId="1699194054" sldId="256"/>
-            <ac:cxnSpMk id="45" creationId="{3FBCC3A0-A790-4564-2079-F745C60BA4EA}"/>
-          </ac:cxnSpMkLst>
-        </pc:cxnChg>
-        <pc:cxnChg chg="mod">
-          <ac:chgData name="UCHIYAMA Yuusuke" userId="758e3d5f-3bbb-4028-bd3a-66c5ef996226" providerId="ADAL" clId="{E78784A1-80B4-458F-8EC5-7324D40B57FB}" dt="2024-12-25T02:03:49.158" v="1"/>
-          <ac:cxnSpMkLst>
-            <pc:docMk/>
-            <pc:sldMk cId="1699194054" sldId="256"/>
-            <ac:cxnSpMk id="48" creationId="{3B5F97CB-6B23-9386-884A-B528CC7DBAB3}"/>
-          </ac:cxnSpMkLst>
-        </pc:cxnChg>
-        <pc:cxnChg chg="mod">
-          <ac:chgData name="UCHIYAMA Yuusuke" userId="758e3d5f-3bbb-4028-bd3a-66c5ef996226" providerId="ADAL" clId="{E78784A1-80B4-458F-8EC5-7324D40B57FB}" dt="2024-12-25T02:03:49.158" v="1"/>
-          <ac:cxnSpMkLst>
-            <pc:docMk/>
-            <pc:sldMk cId="1699194054" sldId="256"/>
-            <ac:cxnSpMk id="50" creationId="{5DEEE675-7B65-8357-DECE-51A52D075DB4}"/>
-          </ac:cxnSpMkLst>
-        </pc:cxnChg>
-        <pc:cxnChg chg="add mod">
-          <ac:chgData name="UCHIYAMA Yuusuke" userId="758e3d5f-3bbb-4028-bd3a-66c5ef996226" providerId="ADAL" clId="{E78784A1-80B4-458F-8EC5-7324D40B57FB}" dt="2024-12-25T02:07:46.241" v="48" actId="1035"/>
-          <ac:cxnSpMkLst>
-            <pc:docMk/>
-            <pc:sldMk cId="1699194054" sldId="256"/>
-            <ac:cxnSpMk id="52" creationId="{D54FC64B-9379-6705-A521-41047F696A46}"/>
-          </ac:cxnSpMkLst>
-        </pc:cxnChg>
-        <pc:cxnChg chg="add mod">
-          <ac:chgData name="UCHIYAMA Yuusuke" userId="758e3d5f-3bbb-4028-bd3a-66c5ef996226" providerId="ADAL" clId="{E78784A1-80B4-458F-8EC5-7324D40B57FB}" dt="2024-12-25T02:07:46.241" v="48" actId="1035"/>
-          <ac:cxnSpMkLst>
-            <pc:docMk/>
-            <pc:sldMk cId="1699194054" sldId="256"/>
-            <ac:cxnSpMk id="53" creationId="{4597718D-87B8-8D11-FD84-5E9652FBE749}"/>
-          </ac:cxnSpMkLst>
-        </pc:cxnChg>
-        <pc:cxnChg chg="add mod">
-          <ac:chgData name="UCHIYAMA Yuusuke" userId="758e3d5f-3bbb-4028-bd3a-66c5ef996226" providerId="ADAL" clId="{E78784A1-80B4-458F-8EC5-7324D40B57FB}" dt="2024-12-25T02:07:46.241" v="48" actId="1035"/>
-          <ac:cxnSpMkLst>
-            <pc:docMk/>
-            <pc:sldMk cId="1699194054" sldId="256"/>
-            <ac:cxnSpMk id="55" creationId="{13067185-5D27-E787-688B-1022DD821C5B}"/>
-          </ac:cxnSpMkLst>
-        </pc:cxnChg>
-        <pc:cxnChg chg="add mod">
-          <ac:chgData name="UCHIYAMA Yuusuke" userId="758e3d5f-3bbb-4028-bd3a-66c5ef996226" providerId="ADAL" clId="{E78784A1-80B4-458F-8EC5-7324D40B57FB}" dt="2024-12-25T02:07:46.241" v="48" actId="1035"/>
-          <ac:cxnSpMkLst>
-            <pc:docMk/>
-            <pc:sldMk cId="1699194054" sldId="256"/>
-            <ac:cxnSpMk id="57" creationId="{88F4F5F0-2A09-A7C3-CB58-B096AA6B5468}"/>
-          </ac:cxnSpMkLst>
-        </pc:cxnChg>
-      </pc:sldChg>
-    </pc:docChg>
-  </pc:docChgLst>
-  <pc:docChgLst>
-    <pc:chgData name="雄祐" userId="758e3d5f-3bbb-4028-bd3a-66c5ef996226" providerId="ADAL" clId="{E631E0D5-2F31-4E73-BF24-82CA72B6452E}"/>
-    <pc:docChg chg="undo redo custSel modSld">
-      <pc:chgData name="雄祐" userId="758e3d5f-3bbb-4028-bd3a-66c5ef996226" providerId="ADAL" clId="{E631E0D5-2F31-4E73-BF24-82CA72B6452E}" dt="2024-12-28T04:22:43.557" v="56" actId="20577"/>
-      <pc:docMkLst>
-        <pc:docMk/>
-      </pc:docMkLst>
-      <pc:sldChg chg="modSp mod">
-        <pc:chgData name="雄祐" userId="758e3d5f-3bbb-4028-bd3a-66c5ef996226" providerId="ADAL" clId="{E631E0D5-2F31-4E73-BF24-82CA72B6452E}" dt="2024-12-28T04:22:43.557" v="56" actId="20577"/>
-        <pc:sldMkLst>
-          <pc:docMk/>
-          <pc:sldMk cId="1699194054" sldId="256"/>
-        </pc:sldMkLst>
-        <pc:spChg chg="mod">
-          <ac:chgData name="雄祐" userId="758e3d5f-3bbb-4028-bd3a-66c5ef996226" providerId="ADAL" clId="{E631E0D5-2F31-4E73-BF24-82CA72B6452E}" dt="2024-12-28T04:20:42.813" v="19" actId="20577"/>
-          <ac:spMkLst>
-            <pc:docMk/>
-            <pc:sldMk cId="1699194054" sldId="256"/>
-            <ac:spMk id="31" creationId="{D4E8B6A9-41A9-CD13-664C-ED6E1871897E}"/>
-          </ac:spMkLst>
-        </pc:spChg>
-        <pc:spChg chg="mod">
-          <ac:chgData name="雄祐" userId="758e3d5f-3bbb-4028-bd3a-66c5ef996226" providerId="ADAL" clId="{E631E0D5-2F31-4E73-BF24-82CA72B6452E}" dt="2024-12-28T04:22:43.557" v="56" actId="20577"/>
-          <ac:spMkLst>
-            <pc:docMk/>
-            <pc:sldMk cId="1699194054" sldId="256"/>
-            <ac:spMk id="54" creationId="{60B87739-26D3-B29A-8E7D-EA03BA44402F}"/>
-          </ac:spMkLst>
-        </pc:spChg>
-        <pc:spChg chg="mod">
-          <ac:chgData name="雄祐" userId="758e3d5f-3bbb-4028-bd3a-66c5ef996226" providerId="ADAL" clId="{E631E0D5-2F31-4E73-BF24-82CA72B6452E}" dt="2024-12-28T04:21:22.495" v="20" actId="1076"/>
-          <ac:spMkLst>
-            <pc:docMk/>
-            <pc:sldMk cId="1699194054" sldId="256"/>
-            <ac:spMk id="56" creationId="{4D5170A6-0EC6-C0CD-883E-779F09EE6C97}"/>
-          </ac:spMkLst>
-        </pc:spChg>
-        <pc:grpChg chg="mod">
-          <ac:chgData name="雄祐" userId="758e3d5f-3bbb-4028-bd3a-66c5ef996226" providerId="ADAL" clId="{E631E0D5-2F31-4E73-BF24-82CA72B6452E}" dt="2024-12-28T04:21:55.474" v="31" actId="1076"/>
-          <ac:grpSpMkLst>
-            <pc:docMk/>
-            <pc:sldMk cId="1699194054" sldId="256"/>
-            <ac:grpSpMk id="2" creationId="{55A18239-71CC-29A6-E1DD-EE839C2CC46B}"/>
-          </ac:grpSpMkLst>
-        </pc:grpChg>
-        <pc:cxnChg chg="mod">
-          <ac:chgData name="雄祐" userId="758e3d5f-3bbb-4028-bd3a-66c5ef996226" providerId="ADAL" clId="{E631E0D5-2F31-4E73-BF24-82CA72B6452E}" dt="2024-12-28T04:22:02.289" v="36" actId="1037"/>
-          <ac:cxnSpMkLst>
-            <pc:docMk/>
-            <pc:sldMk cId="1699194054" sldId="256"/>
-            <ac:cxnSpMk id="40" creationId="{DCB63E80-290B-22A2-6B8B-735D82819EE7}"/>
-          </ac:cxnSpMkLst>
-        </pc:cxnChg>
-        <pc:cxnChg chg="mod">
-          <ac:chgData name="雄祐" userId="758e3d5f-3bbb-4028-bd3a-66c5ef996226" providerId="ADAL" clId="{E631E0D5-2F31-4E73-BF24-82CA72B6452E}" dt="2024-12-28T04:21:53.745" v="30" actId="14100"/>
-          <ac:cxnSpMkLst>
-            <pc:docMk/>
-            <pc:sldMk cId="1699194054" sldId="256"/>
-            <ac:cxnSpMk id="57" creationId="{88F4F5F0-2A09-A7C3-CB58-B096AA6B5468}"/>
-          </ac:cxnSpMkLst>
-        </pc:cxnChg>
       </pc:sldChg>
     </pc:docChg>
   </pc:docChgLst>
@@ -568,7 +352,7 @@
           <a:p>
             <a:fld id="{8E9986EE-3F7C-4D3D-BBD8-750034447C60}" type="datetimeFigureOut">
               <a:rPr kumimoji="1" lang="ja-JP" altLang="en-US" smtClean="0"/>
-              <a:t>2024/12/28</a:t>
+              <a:t>2025/12/8</a:t>
             </a:fld>
             <a:endParaRPr kumimoji="1" lang="ja-JP" altLang="en-US"/>
           </a:p>
@@ -770,7 +554,7 @@
           <a:p>
             <a:fld id="{8E9986EE-3F7C-4D3D-BBD8-750034447C60}" type="datetimeFigureOut">
               <a:rPr kumimoji="1" lang="ja-JP" altLang="en-US" smtClean="0"/>
-              <a:t>2024/12/28</a:t>
+              <a:t>2025/12/8</a:t>
             </a:fld>
             <a:endParaRPr kumimoji="1" lang="ja-JP" altLang="en-US"/>
           </a:p>
@@ -982,7 +766,7 @@
           <a:p>
             <a:fld id="{8E9986EE-3F7C-4D3D-BBD8-750034447C60}" type="datetimeFigureOut">
               <a:rPr kumimoji="1" lang="ja-JP" altLang="en-US" smtClean="0"/>
-              <a:t>2024/12/28</a:t>
+              <a:t>2025/12/8</a:t>
             </a:fld>
             <a:endParaRPr kumimoji="1" lang="ja-JP" altLang="en-US"/>
           </a:p>
@@ -1184,7 +968,7 @@
           <a:p>
             <a:fld id="{8E9986EE-3F7C-4D3D-BBD8-750034447C60}" type="datetimeFigureOut">
               <a:rPr kumimoji="1" lang="ja-JP" altLang="en-US" smtClean="0"/>
-              <a:t>2024/12/28</a:t>
+              <a:t>2025/12/8</a:t>
             </a:fld>
             <a:endParaRPr kumimoji="1" lang="ja-JP" altLang="en-US"/>
           </a:p>
@@ -1430,7 +1214,7 @@
           <a:p>
             <a:fld id="{8E9986EE-3F7C-4D3D-BBD8-750034447C60}" type="datetimeFigureOut">
               <a:rPr kumimoji="1" lang="ja-JP" altLang="en-US" smtClean="0"/>
-              <a:t>2024/12/28</a:t>
+              <a:t>2025/12/8</a:t>
             </a:fld>
             <a:endParaRPr kumimoji="1" lang="ja-JP" altLang="en-US"/>
           </a:p>
@@ -1726,7 +1510,7 @@
           <a:p>
             <a:fld id="{8E9986EE-3F7C-4D3D-BBD8-750034447C60}" type="datetimeFigureOut">
               <a:rPr kumimoji="1" lang="ja-JP" altLang="en-US" smtClean="0"/>
-              <a:t>2024/12/28</a:t>
+              <a:t>2025/12/8</a:t>
             </a:fld>
             <a:endParaRPr kumimoji="1" lang="ja-JP" altLang="en-US"/>
           </a:p>
@@ -2157,7 +1941,7 @@
           <a:p>
             <a:fld id="{8E9986EE-3F7C-4D3D-BBD8-750034447C60}" type="datetimeFigureOut">
               <a:rPr kumimoji="1" lang="ja-JP" altLang="en-US" smtClean="0"/>
-              <a:t>2024/12/28</a:t>
+              <a:t>2025/12/8</a:t>
             </a:fld>
             <a:endParaRPr kumimoji="1" lang="ja-JP" altLang="en-US"/>
           </a:p>
@@ -2275,7 +2059,7 @@
           <a:p>
             <a:fld id="{8E9986EE-3F7C-4D3D-BBD8-750034447C60}" type="datetimeFigureOut">
               <a:rPr kumimoji="1" lang="ja-JP" altLang="en-US" smtClean="0"/>
-              <a:t>2024/12/28</a:t>
+              <a:t>2025/12/8</a:t>
             </a:fld>
             <a:endParaRPr kumimoji="1" lang="ja-JP" altLang="en-US"/>
           </a:p>
@@ -2370,7 +2154,7 @@
           <a:p>
             <a:fld id="{8E9986EE-3F7C-4D3D-BBD8-750034447C60}" type="datetimeFigureOut">
               <a:rPr kumimoji="1" lang="ja-JP" altLang="en-US" smtClean="0"/>
-              <a:t>2024/12/28</a:t>
+              <a:t>2025/12/8</a:t>
             </a:fld>
             <a:endParaRPr kumimoji="1" lang="ja-JP" altLang="en-US"/>
           </a:p>
@@ -2679,7 +2463,7 @@
           <a:p>
             <a:fld id="{8E9986EE-3F7C-4D3D-BBD8-750034447C60}" type="datetimeFigureOut">
               <a:rPr kumimoji="1" lang="ja-JP" altLang="en-US" smtClean="0"/>
-              <a:t>2024/12/28</a:t>
+              <a:t>2025/12/8</a:t>
             </a:fld>
             <a:endParaRPr kumimoji="1" lang="ja-JP" altLang="en-US"/>
           </a:p>
@@ -2936,7 +2720,7 @@
           <a:p>
             <a:fld id="{8E9986EE-3F7C-4D3D-BBD8-750034447C60}" type="datetimeFigureOut">
               <a:rPr kumimoji="1" lang="ja-JP" altLang="en-US" smtClean="0"/>
-              <a:t>2024/12/28</a:t>
+              <a:t>2025/12/8</a:t>
             </a:fld>
             <a:endParaRPr kumimoji="1" lang="ja-JP" altLang="en-US"/>
           </a:p>
@@ -3181,7 +2965,7 @@
           <a:p>
             <a:fld id="{8E9986EE-3F7C-4D3D-BBD8-750034447C60}" type="datetimeFigureOut">
               <a:rPr kumimoji="1" lang="ja-JP" altLang="en-US" smtClean="0"/>
-              <a:t>2024/12/28</a:t>
+              <a:t>2025/12/8</a:t>
             </a:fld>
             <a:endParaRPr kumimoji="1" lang="ja-JP" altLang="en-US"/>
           </a:p>
@@ -3786,8 +3570,8 @@
             </a:p>
           </p:txBody>
         </p:sp>
-        <mc:AlternateContent xmlns:mc="http://schemas.openxmlformats.org/markup-compatibility/2006" xmlns:a14="http://schemas.microsoft.com/office/drawing/2010/main">
-          <mc:Choice Requires="a14">
+        <mc:AlternateContent xmlns:mc="http://schemas.openxmlformats.org/markup-compatibility/2006">
+          <mc:Choice xmlns:a14="http://schemas.microsoft.com/office/drawing/2010/main" Requires="a14">
             <p:sp>
               <p:nvSpPr>
                 <p:cNvPr id="35" name="テキスト ボックス 34">
@@ -3803,7 +3587,7 @@
               <p:spPr>
                 <a:xfrm>
                   <a:off x="25974515" y="24994878"/>
-                  <a:ext cx="1019084" cy="559290"/>
+                  <a:ext cx="997857" cy="559290"/>
                 </a:xfrm>
                 <a:prstGeom prst="rect">
                   <a:avLst/>
@@ -3835,29 +3619,33 @@
                     </m:oMath>
                   </a14:m>
                   <a:r>
-                    <a:rPr kumimoji="1" lang="en-US" altLang="ja-JP" sz="2000" dirty="0"/>
+                    <a:rPr kumimoji="1" lang="en-US" altLang="ja-JP" sz="2000"/>
                     <a:t>(10</a:t>
                   </a:r>
                   <a:r>
-                    <a:rPr kumimoji="1" lang="en-US" altLang="ja-JP" sz="2000" baseline="30000" dirty="0"/>
-                    <a:t>-5</a:t>
+                    <a:rPr kumimoji="1" lang="en-US" altLang="ja-JP" sz="2000" baseline="30000"/>
+                    <a:t>-4</a:t>
+                  </a:r>
+                  <a:r>
+                    <a:rPr kumimoji="1" lang="en-US" altLang="ja-JP" sz="2000"/>
+                    <a:t>) </a:t>
                   </a:r>
                   <a:r>
                     <a:rPr kumimoji="1" lang="en-US" altLang="ja-JP" sz="2000" dirty="0"/>
-                    <a:t>) Pa</a:t>
+                    <a:t>Pa</a:t>
                   </a:r>
                   <a:endParaRPr kumimoji="1" lang="ja-JP" altLang="en-US" sz="2000" dirty="0"/>
                 </a:p>
               </p:txBody>
             </p:sp>
           </mc:Choice>
-          <mc:Fallback xmlns="">
+          <mc:Fallback>
             <p:sp>
               <p:nvSpPr>
-                <p:cNvPr id="172" name="テキスト ボックス 171">
+                <p:cNvPr id="35" name="テキスト ボックス 34">
                   <a:extLst>
                     <a:ext uri="{FF2B5EF4-FFF2-40B4-BE49-F238E27FC236}">
-                      <a16:creationId xmlns:a16="http://schemas.microsoft.com/office/drawing/2014/main" id="{8B9CC99A-C4DF-F202-A965-C6DD46DD167A}"/>
+                      <a16:creationId xmlns:a16="http://schemas.microsoft.com/office/drawing/2014/main" id="{2D3AC4E3-2681-1137-92A8-1402B980DBA6}"/>
                     </a:ext>
                   </a:extLst>
                 </p:cNvPr>
@@ -3869,15 +3657,15 @@
               <p:spPr>
                 <a:xfrm>
                   <a:off x="25974515" y="24994878"/>
-                  <a:ext cx="1019084" cy="559290"/>
+                  <a:ext cx="997857" cy="559290"/>
                 </a:xfrm>
                 <a:prstGeom prst="rect">
                   <a:avLst/>
                 </a:prstGeom>
                 <a:blipFill>
-                  <a:blip r:embed="rId21"/>
+                  <a:blip r:embed="rId3"/>
                   <a:stretch>
-                    <a:fillRect l="-5213" t="-5172" r="-4265" b="-14655"/>
+                    <a:fillRect l="-5314" t="-5172" r="-4348" b="-15517"/>
                   </a:stretch>
                 </a:blipFill>
               </p:spPr>

</xml_diff>